<commit_message>
Final update to slides
</commit_message>
<xml_diff>
--- a/Slides.pptx
+++ b/Slides.pptx
@@ -11,6 +11,7 @@
     <p:sldId id="259" r:id="rId5"/>
     <p:sldId id="260" r:id="rId6"/>
     <p:sldId id="261" r:id="rId7"/>
+    <p:sldId id="262" r:id="rId8"/>
   </p:sldIdLst>
   <p:sldSz cx="9144000" cy="5143500" type="screen16x9"/>
   <p:notesSz cx="6858000" cy="9144000"/>
@@ -3246,7 +3247,7 @@
             <a:pPr lvl="0"/>
             <a:r>
               <a:rPr/>
-              <a:t>Ubi? Stockholm, as you know, so no slide</a:t>
+              <a:t>Ubi? Holmiae (i Stockholm)</a:t>
             </a:r>
           </a:p>
           <a:p>
@@ -3283,7 +3284,7 @@
             </a:pPr>
             <a:r>
               <a:rPr/>
-              <a:t>See Asterix, La Serpe d'Or, p.43 (Anglice: The Golden Sickle)</a:t>
+              <a:t>Vide Asterix, La Serpe d'Or, p.43 (Anglice: The Golden Sickle)</a:t>
             </a:r>
           </a:p>
         </p:txBody>
@@ -3497,7 +3498,7 @@
             <a:pPr lvl="0"/>
             <a:r>
               <a:rPr/>
-              <a:t>Artefacts: code, documentation in repo</a:t>
+              <a:t>Artefacts: code (including demo), documentation: in repo</a:t>
             </a:r>
           </a:p>
         </p:txBody>
@@ -3697,6 +3698,81 @@
             <a:r>
               <a:rPr/>
               <a:t>Decided not to catalogue obstacles</a:t>
+            </a:r>
+          </a:p>
+        </p:txBody>
+      </p:sp>
+    </p:spTree>
+  </p:cSld>
+</p:sld>
+</file>
+
+<file path=ppt/slides/slide7.xml><?xml version="1.0" encoding="utf-8"?>
+<p:sld xmlns:a="http://schemas.openxmlformats.org/drawingml/2006/main" xmlns:r="http://schemas.openxmlformats.org/officeDocument/2006/relationships" xmlns:p="http://schemas.openxmlformats.org/presentationml/2006/main">
+  <p:cSld>
+    <p:spTree>
+      <p:nvGrpSpPr>
+        <p:cNvPr id="1" name=""/>
+        <p:cNvGrpSpPr/>
+        <p:nvPr/>
+      </p:nvGrpSpPr>
+      <p:grpSpPr>
+        <a:xfrm>
+          <a:off x="0" y="0"/>
+          <a:ext cx="0" cy="0"/>
+          <a:chOff x="0" y="0"/>
+          <a:chExt cx="0" cy="0"/>
+        </a:xfrm>
+      </p:grpSpPr>
+      <p:sp>
+        <p:nvSpPr>
+          <p:cNvPr id="2" name="Title 1"/>
+          <p:cNvSpPr>
+            <a:spLocks noGrp="1"/>
+          </p:cNvSpPr>
+          <p:nvPr>
+            <p:ph type="title"/>
+          </p:nvPr>
+        </p:nvSpPr>
+        <p:spPr/>
+        <p:txBody>
+          <a:bodyPr/>
+          <a:lstStyle/>
+          <a:p>
+            <a:pPr lvl="0" indent="0" marL="0">
+              <a:buNone/>
+            </a:pPr>
+            <a:r>
+              <a:rPr/>
+              <a:t>LHB Project at DNS Hackathon 2025</a:t>
+            </a:r>
+          </a:p>
+        </p:txBody>
+      </p:sp>
+      <p:sp>
+        <p:nvSpPr>
+          <p:cNvPr id="3" name="Content Placeholder 2"/>
+          <p:cNvSpPr>
+            <a:spLocks noGrp="1"/>
+          </p:cNvSpPr>
+          <p:nvPr>
+            <p:ph idx="1"/>
+          </p:nvPr>
+        </p:nvSpPr>
+        <p:spPr/>
+        <p:txBody>
+          <a:bodyPr/>
+          <a:lstStyle/>
+          <a:p>
+            <a:pPr lvl="0" indent="0" marL="0">
+              <a:spcBef>
+                <a:spcPts val="3000"/>
+              </a:spcBef>
+              <a:buNone/>
+            </a:pPr>
+            <a:r>
+              <a:rPr b="1"/>
+              <a:t>Et nunc, Ali dat demonstrationem ...</a:t>
             </a:r>
           </a:p>
         </p:txBody>

</xml_diff>